<commit_message>
added MARL and Results
</commit_message>
<xml_diff>
--- a/MAPP_Project_Presentation.pptx
+++ b/MAPP_Project_Presentation.pptx
@@ -15,9 +15,11 @@
     <p:sldId id="264" r:id="rId9"/>
     <p:sldId id="265" r:id="rId10"/>
     <p:sldId id="266" r:id="rId11"/>
-    <p:sldId id="267" r:id="rId12"/>
-    <p:sldId id="268" r:id="rId13"/>
-    <p:sldId id="263" r:id="rId14"/>
+    <p:sldId id="271" r:id="rId12"/>
+    <p:sldId id="267" r:id="rId13"/>
+    <p:sldId id="272" r:id="rId14"/>
+    <p:sldId id="268" r:id="rId15"/>
+    <p:sldId id="263" r:id="rId16"/>
   </p:sldIdLst>
   <p:sldSz cx="12192000" cy="6858000"/>
   <p:notesSz cx="6858000" cy="9144000"/>
@@ -116,6 +118,11 @@
       </a:defRPr>
     </a:lvl9pPr>
   </p:defaultTextStyle>
+  <p:extLst>
+    <p:ext uri="{EFAFB233-063F-42B5-8137-9DF3F51BA10A}">
+      <p15:sldGuideLst xmlns:p15="http://schemas.microsoft.com/office/powerpoint/2012/main"/>
+    </p:ext>
+  </p:extLst>
 </p:presentation>
 </file>
 
@@ -266,7 +273,7 @@
           <a:p>
             <a:fld id="{E65D89EE-70BB-4150-98E6-695022C0D1B2}" type="datetimeFigureOut">
               <a:rPr lang="de-DE" smtClean="0"/>
-              <a:t>28.03.2023</a:t>
+              <a:t>29.03.2023</a:t>
             </a:fld>
             <a:endParaRPr lang="de-DE"/>
           </a:p>
@@ -464,7 +471,7 @@
           <a:p>
             <a:fld id="{E65D89EE-70BB-4150-98E6-695022C0D1B2}" type="datetimeFigureOut">
               <a:rPr lang="de-DE" smtClean="0"/>
-              <a:t>28.03.2023</a:t>
+              <a:t>29.03.2023</a:t>
             </a:fld>
             <a:endParaRPr lang="de-DE"/>
           </a:p>
@@ -672,7 +679,7 @@
           <a:p>
             <a:fld id="{E65D89EE-70BB-4150-98E6-695022C0D1B2}" type="datetimeFigureOut">
               <a:rPr lang="de-DE" smtClean="0"/>
-              <a:t>28.03.2023</a:t>
+              <a:t>29.03.2023</a:t>
             </a:fld>
             <a:endParaRPr lang="de-DE"/>
           </a:p>
@@ -870,7 +877,7 @@
           <a:p>
             <a:fld id="{E65D89EE-70BB-4150-98E6-695022C0D1B2}" type="datetimeFigureOut">
               <a:rPr lang="de-DE" smtClean="0"/>
-              <a:t>28.03.2023</a:t>
+              <a:t>29.03.2023</a:t>
             </a:fld>
             <a:endParaRPr lang="de-DE"/>
           </a:p>
@@ -1145,7 +1152,7 @@
           <a:p>
             <a:fld id="{E65D89EE-70BB-4150-98E6-695022C0D1B2}" type="datetimeFigureOut">
               <a:rPr lang="de-DE" smtClean="0"/>
-              <a:t>28.03.2023</a:t>
+              <a:t>29.03.2023</a:t>
             </a:fld>
             <a:endParaRPr lang="de-DE"/>
           </a:p>
@@ -1410,7 +1417,7 @@
           <a:p>
             <a:fld id="{E65D89EE-70BB-4150-98E6-695022C0D1B2}" type="datetimeFigureOut">
               <a:rPr lang="de-DE" smtClean="0"/>
-              <a:t>28.03.2023</a:t>
+              <a:t>29.03.2023</a:t>
             </a:fld>
             <a:endParaRPr lang="de-DE"/>
           </a:p>
@@ -1822,7 +1829,7 @@
           <a:p>
             <a:fld id="{E65D89EE-70BB-4150-98E6-695022C0D1B2}" type="datetimeFigureOut">
               <a:rPr lang="de-DE" smtClean="0"/>
-              <a:t>28.03.2023</a:t>
+              <a:t>29.03.2023</a:t>
             </a:fld>
             <a:endParaRPr lang="de-DE"/>
           </a:p>
@@ -1963,7 +1970,7 @@
           <a:p>
             <a:fld id="{E65D89EE-70BB-4150-98E6-695022C0D1B2}" type="datetimeFigureOut">
               <a:rPr lang="de-DE" smtClean="0"/>
-              <a:t>28.03.2023</a:t>
+              <a:t>29.03.2023</a:t>
             </a:fld>
             <a:endParaRPr lang="de-DE"/>
           </a:p>
@@ -2076,7 +2083,7 @@
           <a:p>
             <a:fld id="{E65D89EE-70BB-4150-98E6-695022C0D1B2}" type="datetimeFigureOut">
               <a:rPr lang="de-DE" smtClean="0"/>
-              <a:t>28.03.2023</a:t>
+              <a:t>29.03.2023</a:t>
             </a:fld>
             <a:endParaRPr lang="de-DE"/>
           </a:p>
@@ -2387,7 +2394,7 @@
           <a:p>
             <a:fld id="{E65D89EE-70BB-4150-98E6-695022C0D1B2}" type="datetimeFigureOut">
               <a:rPr lang="de-DE" smtClean="0"/>
-              <a:t>28.03.2023</a:t>
+              <a:t>29.03.2023</a:t>
             </a:fld>
             <a:endParaRPr lang="de-DE"/>
           </a:p>
@@ -2675,7 +2682,7 @@
           <a:p>
             <a:fld id="{E65D89EE-70BB-4150-98E6-695022C0D1B2}" type="datetimeFigureOut">
               <a:rPr lang="de-DE" smtClean="0"/>
-              <a:t>28.03.2023</a:t>
+              <a:t>29.03.2023</a:t>
             </a:fld>
             <a:endParaRPr lang="de-DE"/>
           </a:p>
@@ -2916,7 +2923,7 @@
           <a:p>
             <a:fld id="{E65D89EE-70BB-4150-98E6-695022C0D1B2}" type="datetimeFigureOut">
               <a:rPr lang="de-DE" smtClean="0"/>
-              <a:t>28.03.2023</a:t>
+              <a:t>29.03.2023</a:t>
             </a:fld>
             <a:endParaRPr lang="de-DE"/>
           </a:p>
@@ -3637,41 +3644,41 @@
             </a:br>
             <a:r>
               <a:rPr lang="de-DE" sz="3200" dirty="0" err="1"/>
-              <a:t>Self</a:t>
-            </a:r>
-            <a:r>
-              <a:rPr lang="de-DE" sz="3200" dirty="0"/>
-              <a:t> Play</a:t>
+              <a:t>PettingZoo</a:t>
             </a:r>
             <a:endParaRPr lang="de-DE" dirty="0"/>
           </a:p>
         </p:txBody>
       </p:sp>
-      <p:sp>
-        <p:nvSpPr>
-          <p:cNvPr id="11" name="Inhaltsplatzhalter 10">
-            <a:extLst>
-              <a:ext uri="{FF2B5EF4-FFF2-40B4-BE49-F238E27FC236}">
-                <a16:creationId xmlns:a16="http://schemas.microsoft.com/office/drawing/2014/main" id="{38C2434D-4EDE-B5EF-69A0-0DBEAA52AF54}"/>
-              </a:ext>
-            </a:extLst>
-          </p:cNvPr>
-          <p:cNvSpPr>
-            <a:spLocks noGrp="1"/>
-          </p:cNvSpPr>
+      <p:pic>
+        <p:nvPicPr>
+          <p:cNvPr id="13" name="Inhaltsplatzhalter 12">
+            <a:extLst>
+              <a:ext uri="{FF2B5EF4-FFF2-40B4-BE49-F238E27FC236}">
+                <a16:creationId xmlns:a16="http://schemas.microsoft.com/office/drawing/2014/main" id="{34092DA1-4DB7-1E45-B0FF-53A140FB88C7}"/>
+              </a:ext>
+            </a:extLst>
+          </p:cNvPr>
+          <p:cNvPicPr>
+            <a:picLocks noGrp="1" noChangeAspect="1"/>
+          </p:cNvPicPr>
           <p:nvPr>
             <p:ph idx="1"/>
           </p:nvPr>
-        </p:nvSpPr>
-        <p:spPr/>
-        <p:txBody>
-          <a:bodyPr/>
-          <a:lstStyle/>
-          <a:p>
-            <a:endParaRPr lang="de-DE" dirty="0"/>
-          </a:p>
-        </p:txBody>
-      </p:sp>
+        </p:nvPicPr>
+        <p:blipFill>
+          <a:blip r:embed="rId2"/>
+          <a:stretch>
+            <a:fillRect/>
+          </a:stretch>
+        </p:blipFill>
+        <p:spPr>
+          <a:xfrm>
+            <a:off x="838200" y="2474794"/>
+            <a:ext cx="10515600" cy="2362119"/>
+          </a:xfrm>
+        </p:spPr>
+      </p:pic>
     </p:spTree>
     <p:extLst>
       <p:ext uri="{BB962C8B-B14F-4D97-AF65-F5344CB8AC3E}">
@@ -3727,14 +3734,18 @@
           <a:p>
             <a:r>
               <a:rPr lang="en-US" b="1" cap="all" dirty="0"/>
-              <a:t>RESULTS</a:t>
+              <a:t>Extend Model to Multi-Agent RL</a:t>
             </a:r>
             <a:br>
               <a:rPr lang="de-DE" dirty="0"/>
             </a:br>
             <a:r>
               <a:rPr lang="de-DE" sz="3200" dirty="0" err="1"/>
-              <a:t>Metrics</a:t>
+              <a:t>Self</a:t>
+            </a:r>
+            <a:r>
+              <a:rPr lang="de-DE" sz="3200" dirty="0"/>
+              <a:t> Play</a:t>
             </a:r>
             <a:endParaRPr lang="de-DE" dirty="0"/>
           </a:p>
@@ -3756,11 +3767,477 @@
             <p:ph idx="1"/>
           </p:nvPr>
         </p:nvSpPr>
-        <p:spPr/>
-        <p:txBody>
-          <a:bodyPr/>
-          <a:lstStyle/>
-          <a:p>
+        <p:spPr>
+          <a:xfrm>
+            <a:off x="454152" y="1990217"/>
+            <a:ext cx="5641848" cy="4351338"/>
+          </a:xfrm>
+        </p:spPr>
+        <p:txBody>
+          <a:bodyPr/>
+          <a:lstStyle/>
+          <a:p>
+            <a:pPr marL="0" indent="0">
+              <a:buNone/>
+            </a:pPr>
+            <a:r>
+              <a:rPr lang="de-DE" dirty="0"/>
+              <a:t>Both </a:t>
+            </a:r>
+            <a:r>
+              <a:rPr lang="de-DE" dirty="0" err="1"/>
+              <a:t>agents</a:t>
+            </a:r>
+            <a:r>
+              <a:rPr lang="de-DE" dirty="0"/>
+              <a:t> </a:t>
+            </a:r>
+            <a:r>
+              <a:rPr lang="de-DE" dirty="0" err="1"/>
+              <a:t>share</a:t>
+            </a:r>
+            <a:r>
+              <a:rPr lang="de-DE" dirty="0"/>
+              <a:t>:</a:t>
+            </a:r>
+          </a:p>
+          <a:p>
+            <a:pPr marL="0" indent="0">
+              <a:buNone/>
+            </a:pPr>
+            <a:endParaRPr lang="de-DE" dirty="0"/>
+          </a:p>
+          <a:p>
+            <a:pPr lvl="1"/>
+            <a:r>
+              <a:rPr lang="de-DE" dirty="0"/>
+              <a:t>Action-</a:t>
+            </a:r>
+            <a:r>
+              <a:rPr lang="de-DE" dirty="0" err="1"/>
+              <a:t>space</a:t>
+            </a:r>
+            <a:endParaRPr lang="de-DE" dirty="0"/>
+          </a:p>
+          <a:p>
+            <a:pPr lvl="1"/>
+            <a:endParaRPr lang="de-DE" dirty="0"/>
+          </a:p>
+          <a:p>
+            <a:pPr lvl="1"/>
+            <a:r>
+              <a:rPr lang="de-DE" dirty="0"/>
+              <a:t>General </a:t>
+            </a:r>
+            <a:r>
+              <a:rPr lang="de-DE" dirty="0" err="1"/>
+              <a:t>task</a:t>
+            </a:r>
+            <a:endParaRPr lang="de-DE" dirty="0"/>
+          </a:p>
+          <a:p>
+            <a:pPr lvl="1"/>
+            <a:endParaRPr lang="de-DE" dirty="0"/>
+          </a:p>
+          <a:p>
+            <a:pPr lvl="1"/>
+            <a:r>
+              <a:rPr lang="de-DE" dirty="0" err="1"/>
+              <a:t>Reward</a:t>
+            </a:r>
+            <a:r>
+              <a:rPr lang="de-DE" dirty="0"/>
+              <a:t> </a:t>
+            </a:r>
+            <a:r>
+              <a:rPr lang="de-DE" dirty="0" err="1"/>
+              <a:t>structure</a:t>
+            </a:r>
+            <a:endParaRPr lang="de-DE" dirty="0"/>
+          </a:p>
+          <a:p>
+            <a:pPr lvl="1"/>
+            <a:endParaRPr lang="de-DE" dirty="0"/>
+          </a:p>
+          <a:p>
+            <a:pPr lvl="1"/>
+            <a:r>
+              <a:rPr lang="de-DE" dirty="0"/>
+              <a:t>Observation (</a:t>
+            </a:r>
+            <a:r>
+              <a:rPr lang="de-DE" dirty="0" err="1"/>
+              <a:t>space</a:t>
+            </a:r>
+            <a:r>
+              <a:rPr lang="de-DE" dirty="0"/>
+              <a:t>)</a:t>
+            </a:r>
+          </a:p>
+          <a:p>
+            <a:pPr marL="457200" lvl="1" indent="0">
+              <a:buNone/>
+            </a:pPr>
+            <a:endParaRPr lang="de-DE" dirty="0"/>
+          </a:p>
+          <a:p>
+            <a:pPr marL="457200" lvl="1" indent="0">
+              <a:buNone/>
+            </a:pPr>
+            <a:endParaRPr lang="de-DE" dirty="0"/>
+          </a:p>
+          <a:p>
+            <a:pPr lvl="1"/>
+            <a:endParaRPr lang="de-DE" dirty="0"/>
+          </a:p>
+        </p:txBody>
+      </p:sp>
+      <p:sp>
+        <p:nvSpPr>
+          <p:cNvPr id="3" name="Inhaltsplatzhalter 10">
+            <a:extLst>
+              <a:ext uri="{FF2B5EF4-FFF2-40B4-BE49-F238E27FC236}">
+                <a16:creationId xmlns:a16="http://schemas.microsoft.com/office/drawing/2014/main" id="{6DCB4CC5-7E96-A3DC-9AE9-A22190BF78BC}"/>
+              </a:ext>
+            </a:extLst>
+          </p:cNvPr>
+          <p:cNvSpPr txBox="1">
+            <a:spLocks/>
+          </p:cNvSpPr>
+          <p:nvPr/>
+        </p:nvSpPr>
+        <p:spPr>
+          <a:xfrm>
+            <a:off x="6096000" y="1990217"/>
+            <a:ext cx="5849112" cy="4351338"/>
+          </a:xfrm>
+          <a:prstGeom prst="rect">
+            <a:avLst/>
+          </a:prstGeom>
+        </p:spPr>
+        <p:txBody>
+          <a:bodyPr vert="horz" lIns="91440" tIns="45720" rIns="91440" bIns="45720" rtlCol="0">
+            <a:normAutofit/>
+          </a:bodyPr>
+          <a:lstStyle>
+            <a:lvl1pPr marL="228600" indent="-228600" algn="l" defTabSz="914400" rtl="0" eaLnBrk="1" latinLnBrk="0" hangingPunct="1">
+              <a:lnSpc>
+                <a:spcPct val="90000"/>
+              </a:lnSpc>
+              <a:spcBef>
+                <a:spcPts val="1000"/>
+              </a:spcBef>
+              <a:buFont typeface="Arial" panose="020B0604020202020204" pitchFamily="34" charset="0"/>
+              <a:buChar char="•"/>
+              <a:defRPr sz="2800" kern="1200">
+                <a:solidFill>
+                  <a:schemeClr val="tx1"/>
+                </a:solidFill>
+                <a:latin typeface="+mn-lt"/>
+                <a:ea typeface="+mn-ea"/>
+                <a:cs typeface="+mn-cs"/>
+              </a:defRPr>
+            </a:lvl1pPr>
+            <a:lvl2pPr marL="685800" indent="-228600" algn="l" defTabSz="914400" rtl="0" eaLnBrk="1" latinLnBrk="0" hangingPunct="1">
+              <a:lnSpc>
+                <a:spcPct val="90000"/>
+              </a:lnSpc>
+              <a:spcBef>
+                <a:spcPts val="500"/>
+              </a:spcBef>
+              <a:buFont typeface="Arial" panose="020B0604020202020204" pitchFamily="34" charset="0"/>
+              <a:buChar char="•"/>
+              <a:defRPr sz="2400" kern="1200">
+                <a:solidFill>
+                  <a:schemeClr val="tx1"/>
+                </a:solidFill>
+                <a:latin typeface="+mn-lt"/>
+                <a:ea typeface="+mn-ea"/>
+                <a:cs typeface="+mn-cs"/>
+              </a:defRPr>
+            </a:lvl2pPr>
+            <a:lvl3pPr marL="1143000" indent="-228600" algn="l" defTabSz="914400" rtl="0" eaLnBrk="1" latinLnBrk="0" hangingPunct="1">
+              <a:lnSpc>
+                <a:spcPct val="90000"/>
+              </a:lnSpc>
+              <a:spcBef>
+                <a:spcPts val="500"/>
+              </a:spcBef>
+              <a:buFont typeface="Arial" panose="020B0604020202020204" pitchFamily="34" charset="0"/>
+              <a:buChar char="•"/>
+              <a:defRPr sz="2000" kern="1200">
+                <a:solidFill>
+                  <a:schemeClr val="tx1"/>
+                </a:solidFill>
+                <a:latin typeface="+mn-lt"/>
+                <a:ea typeface="+mn-ea"/>
+                <a:cs typeface="+mn-cs"/>
+              </a:defRPr>
+            </a:lvl3pPr>
+            <a:lvl4pPr marL="1600200" indent="-228600" algn="l" defTabSz="914400" rtl="0" eaLnBrk="1" latinLnBrk="0" hangingPunct="1">
+              <a:lnSpc>
+                <a:spcPct val="90000"/>
+              </a:lnSpc>
+              <a:spcBef>
+                <a:spcPts val="500"/>
+              </a:spcBef>
+              <a:buFont typeface="Arial" panose="020B0604020202020204" pitchFamily="34" charset="0"/>
+              <a:buChar char="•"/>
+              <a:defRPr sz="1800" kern="1200">
+                <a:solidFill>
+                  <a:schemeClr val="tx1"/>
+                </a:solidFill>
+                <a:latin typeface="+mn-lt"/>
+                <a:ea typeface="+mn-ea"/>
+                <a:cs typeface="+mn-cs"/>
+              </a:defRPr>
+            </a:lvl4pPr>
+            <a:lvl5pPr marL="2057400" indent="-228600" algn="l" defTabSz="914400" rtl="0" eaLnBrk="1" latinLnBrk="0" hangingPunct="1">
+              <a:lnSpc>
+                <a:spcPct val="90000"/>
+              </a:lnSpc>
+              <a:spcBef>
+                <a:spcPts val="500"/>
+              </a:spcBef>
+              <a:buFont typeface="Arial" panose="020B0604020202020204" pitchFamily="34" charset="0"/>
+              <a:buChar char="•"/>
+              <a:defRPr sz="1800" kern="1200">
+                <a:solidFill>
+                  <a:schemeClr val="tx1"/>
+                </a:solidFill>
+                <a:latin typeface="+mn-lt"/>
+                <a:ea typeface="+mn-ea"/>
+                <a:cs typeface="+mn-cs"/>
+              </a:defRPr>
+            </a:lvl5pPr>
+            <a:lvl6pPr marL="2514600" indent="-228600" algn="l" defTabSz="914400" rtl="0" eaLnBrk="1" latinLnBrk="0" hangingPunct="1">
+              <a:lnSpc>
+                <a:spcPct val="90000"/>
+              </a:lnSpc>
+              <a:spcBef>
+                <a:spcPts val="500"/>
+              </a:spcBef>
+              <a:buFont typeface="Arial" panose="020B0604020202020204" pitchFamily="34" charset="0"/>
+              <a:buChar char="•"/>
+              <a:defRPr sz="1800" kern="1200">
+                <a:solidFill>
+                  <a:schemeClr val="tx1"/>
+                </a:solidFill>
+                <a:latin typeface="+mn-lt"/>
+                <a:ea typeface="+mn-ea"/>
+                <a:cs typeface="+mn-cs"/>
+              </a:defRPr>
+            </a:lvl6pPr>
+            <a:lvl7pPr marL="2971800" indent="-228600" algn="l" defTabSz="914400" rtl="0" eaLnBrk="1" latinLnBrk="0" hangingPunct="1">
+              <a:lnSpc>
+                <a:spcPct val="90000"/>
+              </a:lnSpc>
+              <a:spcBef>
+                <a:spcPts val="500"/>
+              </a:spcBef>
+              <a:buFont typeface="Arial" panose="020B0604020202020204" pitchFamily="34" charset="0"/>
+              <a:buChar char="•"/>
+              <a:defRPr sz="1800" kern="1200">
+                <a:solidFill>
+                  <a:schemeClr val="tx1"/>
+                </a:solidFill>
+                <a:latin typeface="+mn-lt"/>
+                <a:ea typeface="+mn-ea"/>
+                <a:cs typeface="+mn-cs"/>
+              </a:defRPr>
+            </a:lvl7pPr>
+            <a:lvl8pPr marL="3429000" indent="-228600" algn="l" defTabSz="914400" rtl="0" eaLnBrk="1" latinLnBrk="0" hangingPunct="1">
+              <a:lnSpc>
+                <a:spcPct val="90000"/>
+              </a:lnSpc>
+              <a:spcBef>
+                <a:spcPts val="500"/>
+              </a:spcBef>
+              <a:buFont typeface="Arial" panose="020B0604020202020204" pitchFamily="34" charset="0"/>
+              <a:buChar char="•"/>
+              <a:defRPr sz="1800" kern="1200">
+                <a:solidFill>
+                  <a:schemeClr val="tx1"/>
+                </a:solidFill>
+                <a:latin typeface="+mn-lt"/>
+                <a:ea typeface="+mn-ea"/>
+                <a:cs typeface="+mn-cs"/>
+              </a:defRPr>
+            </a:lvl8pPr>
+            <a:lvl9pPr marL="3886200" indent="-228600" algn="l" defTabSz="914400" rtl="0" eaLnBrk="1" latinLnBrk="0" hangingPunct="1">
+              <a:lnSpc>
+                <a:spcPct val="90000"/>
+              </a:lnSpc>
+              <a:spcBef>
+                <a:spcPts val="500"/>
+              </a:spcBef>
+              <a:buFont typeface="Arial" panose="020B0604020202020204" pitchFamily="34" charset="0"/>
+              <a:buChar char="•"/>
+              <a:defRPr sz="1800" kern="1200">
+                <a:solidFill>
+                  <a:schemeClr val="tx1"/>
+                </a:solidFill>
+                <a:latin typeface="+mn-lt"/>
+                <a:ea typeface="+mn-ea"/>
+                <a:cs typeface="+mn-cs"/>
+              </a:defRPr>
+            </a:lvl9pPr>
+          </a:lstStyle>
+          <a:p>
+            <a:pPr marL="0" indent="0">
+              <a:buNone/>
+            </a:pPr>
+            <a:r>
+              <a:rPr lang="de-DE" dirty="0"/>
+              <a:t>Benefits:</a:t>
+            </a:r>
+          </a:p>
+          <a:p>
+            <a:pPr marL="0" indent="0">
+              <a:buNone/>
+            </a:pPr>
+            <a:endParaRPr lang="de-DE" dirty="0"/>
+          </a:p>
+          <a:p>
+            <a:pPr lvl="1"/>
+            <a:r>
+              <a:rPr lang="de-DE" dirty="0" err="1"/>
+              <a:t>Only</a:t>
+            </a:r>
+            <a:r>
+              <a:rPr lang="de-DE" dirty="0"/>
+              <a:t> </a:t>
+            </a:r>
+            <a:r>
+              <a:rPr lang="de-DE" dirty="0" err="1"/>
+              <a:t>one</a:t>
+            </a:r>
+            <a:r>
+              <a:rPr lang="de-DE" dirty="0"/>
+              <a:t> network </a:t>
+            </a:r>
+            <a:r>
+              <a:rPr lang="de-DE" dirty="0" err="1"/>
+              <a:t>to</a:t>
+            </a:r>
+            <a:r>
+              <a:rPr lang="de-DE" dirty="0"/>
+              <a:t> </a:t>
+            </a:r>
+            <a:r>
+              <a:rPr lang="de-DE" dirty="0" err="1"/>
+              <a:t>train</a:t>
+            </a:r>
+            <a:endParaRPr lang="de-DE" dirty="0"/>
+          </a:p>
+          <a:p>
+            <a:pPr lvl="1"/>
+            <a:endParaRPr lang="de-DE" dirty="0"/>
+          </a:p>
+          <a:p>
+            <a:pPr lvl="1"/>
+            <a:r>
+              <a:rPr lang="de-DE" dirty="0"/>
+              <a:t>Higher </a:t>
+            </a:r>
+            <a:r>
+              <a:rPr lang="de-DE" dirty="0" err="1"/>
+              <a:t>efficiency</a:t>
+            </a:r>
+            <a:r>
+              <a:rPr lang="de-DE" dirty="0"/>
+              <a:t> </a:t>
+            </a:r>
+            <a:r>
+              <a:rPr lang="de-DE" dirty="0" err="1"/>
+              <a:t>as</a:t>
+            </a:r>
+            <a:r>
+              <a:rPr lang="de-DE" dirty="0"/>
+              <a:t> all </a:t>
+            </a:r>
+            <a:r>
+              <a:rPr lang="de-DE" dirty="0" err="1"/>
+              <a:t>the</a:t>
+            </a:r>
+            <a:r>
+              <a:rPr lang="de-DE" dirty="0"/>
+              <a:t> </a:t>
+            </a:r>
+            <a:r>
+              <a:rPr lang="de-DE" dirty="0" err="1"/>
+              <a:t>computing</a:t>
+            </a:r>
+            <a:r>
+              <a:rPr lang="de-DE" dirty="0"/>
+              <a:t> power </a:t>
+            </a:r>
+            <a:r>
+              <a:rPr lang="de-DE" dirty="0" err="1"/>
+              <a:t>is</a:t>
+            </a:r>
+            <a:r>
+              <a:rPr lang="de-DE" dirty="0"/>
+              <a:t> </a:t>
+            </a:r>
+            <a:r>
+              <a:rPr lang="de-DE" dirty="0" err="1"/>
+              <a:t>concentrated</a:t>
+            </a:r>
+            <a:r>
+              <a:rPr lang="de-DE" dirty="0"/>
+              <a:t> on </a:t>
+            </a:r>
+            <a:r>
+              <a:rPr lang="de-DE" dirty="0" err="1"/>
+              <a:t>one</a:t>
+            </a:r>
+            <a:r>
+              <a:rPr lang="de-DE" dirty="0"/>
+              <a:t> network</a:t>
+            </a:r>
+          </a:p>
+          <a:p>
+            <a:pPr lvl="1"/>
+            <a:endParaRPr lang="de-DE" dirty="0"/>
+          </a:p>
+          <a:p>
+            <a:pPr lvl="1"/>
+            <a:r>
+              <a:rPr lang="de-DE" dirty="0"/>
+              <a:t>Opponent </a:t>
+            </a:r>
+            <a:r>
+              <a:rPr lang="de-DE" dirty="0" err="1"/>
+              <a:t>difficulty</a:t>
+            </a:r>
+            <a:r>
+              <a:rPr lang="de-DE" dirty="0"/>
+              <a:t> </a:t>
+            </a:r>
+            <a:r>
+              <a:rPr lang="de-DE" dirty="0" err="1"/>
+              <a:t>scales</a:t>
+            </a:r>
+            <a:r>
+              <a:rPr lang="de-DE" dirty="0"/>
+              <a:t> </a:t>
+            </a:r>
+            <a:r>
+              <a:rPr lang="de-DE" dirty="0" err="1"/>
+              <a:t>nicely</a:t>
+            </a:r>
+            <a:endParaRPr lang="de-DE" dirty="0"/>
+          </a:p>
+          <a:p>
+            <a:pPr marL="457200" lvl="1" indent="0">
+              <a:buFont typeface="Arial" panose="020B0604020202020204" pitchFamily="34" charset="0"/>
+              <a:buNone/>
+            </a:pPr>
+            <a:endParaRPr lang="de-DE" dirty="0"/>
+          </a:p>
+          <a:p>
+            <a:pPr lvl="1"/>
             <a:endParaRPr lang="de-DE" dirty="0"/>
           </a:p>
         </p:txBody>
@@ -3768,7 +4245,7 @@
     </p:spTree>
     <p:extLst>
       <p:ext uri="{BB962C8B-B14F-4D97-AF65-F5344CB8AC3E}">
-        <p14:creationId xmlns:p14="http://schemas.microsoft.com/office/powerpoint/2010/main" val="3051589061"/>
+        <p14:creationId xmlns:p14="http://schemas.microsoft.com/office/powerpoint/2010/main" val="725200550"/>
       </p:ext>
     </p:extLst>
   </p:cSld>
@@ -3827,6 +4304,212 @@
             </a:br>
             <a:r>
               <a:rPr lang="de-DE" sz="3200" dirty="0"/>
+              <a:t>single-agent</a:t>
+            </a:r>
+            <a:endParaRPr lang="de-DE" dirty="0"/>
+          </a:p>
+        </p:txBody>
+      </p:sp>
+      <p:pic>
+        <p:nvPicPr>
+          <p:cNvPr id="4" name="Inhaltsplatzhalter 3" descr="Ein Bild, das Diagramm enthält.&#10;&#10;Automatisch generierte Beschreibung">
+            <a:extLst>
+              <a:ext uri="{FF2B5EF4-FFF2-40B4-BE49-F238E27FC236}">
+                <a16:creationId xmlns:a16="http://schemas.microsoft.com/office/drawing/2014/main" id="{B3BA93E6-2E76-7067-4827-9C4E21A00733}"/>
+              </a:ext>
+            </a:extLst>
+          </p:cNvPr>
+          <p:cNvPicPr>
+            <a:picLocks noGrp="1" noChangeAspect="1"/>
+          </p:cNvPicPr>
+          <p:nvPr>
+            <p:ph idx="1"/>
+          </p:nvPr>
+        </p:nvPicPr>
+        <p:blipFill>
+          <a:blip r:embed="rId2">
+            <a:extLst>
+              <a:ext uri="{28A0092B-C50C-407E-A947-70E740481C1C}">
+                <a14:useLocalDpi xmlns:a14="http://schemas.microsoft.com/office/drawing/2010/main" val="0"/>
+              </a:ext>
+            </a:extLst>
+          </a:blip>
+          <a:stretch>
+            <a:fillRect/>
+          </a:stretch>
+        </p:blipFill>
+        <p:spPr>
+          <a:xfrm>
+            <a:off x="1625767" y="1690688"/>
+            <a:ext cx="8940466" cy="4844983"/>
+          </a:xfrm>
+        </p:spPr>
+      </p:pic>
+    </p:spTree>
+    <p:extLst>
+      <p:ext uri="{BB962C8B-B14F-4D97-AF65-F5344CB8AC3E}">
+        <p14:creationId xmlns:p14="http://schemas.microsoft.com/office/powerpoint/2010/main" val="3051589061"/>
+      </p:ext>
+    </p:extLst>
+  </p:cSld>
+  <p:clrMapOvr>
+    <a:masterClrMapping/>
+  </p:clrMapOvr>
+</p:sld>
+</file>
+
+<file path=ppt/slides/slide13.xml><?xml version="1.0" encoding="utf-8"?>
+<p:sld xmlns:a="http://schemas.openxmlformats.org/drawingml/2006/main" xmlns:r="http://schemas.openxmlformats.org/officeDocument/2006/relationships" xmlns:p="http://schemas.openxmlformats.org/presentationml/2006/main">
+  <p:cSld>
+    <p:spTree>
+      <p:nvGrpSpPr>
+        <p:cNvPr id="1" name=""/>
+        <p:cNvGrpSpPr/>
+        <p:nvPr/>
+      </p:nvGrpSpPr>
+      <p:grpSpPr>
+        <a:xfrm>
+          <a:off x="0" y="0"/>
+          <a:ext cx="0" cy="0"/>
+          <a:chOff x="0" y="0"/>
+          <a:chExt cx="0" cy="0"/>
+        </a:xfrm>
+      </p:grpSpPr>
+      <p:sp>
+        <p:nvSpPr>
+          <p:cNvPr id="2" name="Titel 1">
+            <a:extLst>
+              <a:ext uri="{FF2B5EF4-FFF2-40B4-BE49-F238E27FC236}">
+                <a16:creationId xmlns:a16="http://schemas.microsoft.com/office/drawing/2014/main" id="{FC69C5D6-EC21-95F9-1084-9BFDE4708C73}"/>
+              </a:ext>
+            </a:extLst>
+          </p:cNvPr>
+          <p:cNvSpPr>
+            <a:spLocks noGrp="1"/>
+          </p:cNvSpPr>
+          <p:nvPr>
+            <p:ph type="title"/>
+          </p:nvPr>
+        </p:nvSpPr>
+        <p:spPr/>
+        <p:txBody>
+          <a:bodyPr>
+            <a:normAutofit/>
+          </a:bodyPr>
+          <a:lstStyle/>
+          <a:p>
+            <a:r>
+              <a:rPr lang="en-US" b="1" cap="all" dirty="0"/>
+              <a:t>RESULTS</a:t>
+            </a:r>
+            <a:br>
+              <a:rPr lang="de-DE" dirty="0"/>
+            </a:br>
+            <a:r>
+              <a:rPr lang="de-DE" sz="3200" dirty="0"/>
+              <a:t>multi-agent</a:t>
+            </a:r>
+            <a:endParaRPr lang="de-DE" dirty="0"/>
+          </a:p>
+        </p:txBody>
+      </p:sp>
+      <p:pic>
+        <p:nvPicPr>
+          <p:cNvPr id="7" name="Inhaltsplatzhalter 6" descr="Ein Bild, das Diagramm enthält.&#10;&#10;Automatisch generierte Beschreibung">
+            <a:extLst>
+              <a:ext uri="{FF2B5EF4-FFF2-40B4-BE49-F238E27FC236}">
+                <a16:creationId xmlns:a16="http://schemas.microsoft.com/office/drawing/2014/main" id="{01CE89A0-8EAF-D2DF-F7B6-D104A2D4C841}"/>
+              </a:ext>
+            </a:extLst>
+          </p:cNvPr>
+          <p:cNvPicPr>
+            <a:picLocks noGrp="1" noChangeAspect="1"/>
+          </p:cNvPicPr>
+          <p:nvPr>
+            <p:ph idx="1"/>
+          </p:nvPr>
+        </p:nvPicPr>
+        <p:blipFill>
+          <a:blip r:embed="rId2">
+            <a:extLst>
+              <a:ext uri="{28A0092B-C50C-407E-A947-70E740481C1C}">
+                <a14:useLocalDpi xmlns:a14="http://schemas.microsoft.com/office/drawing/2010/main" val="0"/>
+              </a:ext>
+            </a:extLst>
+          </a:blip>
+          <a:stretch>
+            <a:fillRect/>
+          </a:stretch>
+        </p:blipFill>
+        <p:spPr>
+          <a:xfrm>
+            <a:off x="1612200" y="1626824"/>
+            <a:ext cx="8967600" cy="4866051"/>
+          </a:xfrm>
+        </p:spPr>
+      </p:pic>
+    </p:spTree>
+    <p:extLst>
+      <p:ext uri="{BB962C8B-B14F-4D97-AF65-F5344CB8AC3E}">
+        <p14:creationId xmlns:p14="http://schemas.microsoft.com/office/powerpoint/2010/main" val="1465105798"/>
+      </p:ext>
+    </p:extLst>
+  </p:cSld>
+  <p:clrMapOvr>
+    <a:masterClrMapping/>
+  </p:clrMapOvr>
+</p:sld>
+</file>
+
+<file path=ppt/slides/slide14.xml><?xml version="1.0" encoding="utf-8"?>
+<p:sld xmlns:a="http://schemas.openxmlformats.org/drawingml/2006/main" xmlns:r="http://schemas.openxmlformats.org/officeDocument/2006/relationships" xmlns:p="http://schemas.openxmlformats.org/presentationml/2006/main">
+  <p:cSld>
+    <p:spTree>
+      <p:nvGrpSpPr>
+        <p:cNvPr id="1" name=""/>
+        <p:cNvGrpSpPr/>
+        <p:nvPr/>
+      </p:nvGrpSpPr>
+      <p:grpSpPr>
+        <a:xfrm>
+          <a:off x="0" y="0"/>
+          <a:ext cx="0" cy="0"/>
+          <a:chOff x="0" y="0"/>
+          <a:chExt cx="0" cy="0"/>
+        </a:xfrm>
+      </p:grpSpPr>
+      <p:sp>
+        <p:nvSpPr>
+          <p:cNvPr id="2" name="Titel 1">
+            <a:extLst>
+              <a:ext uri="{FF2B5EF4-FFF2-40B4-BE49-F238E27FC236}">
+                <a16:creationId xmlns:a16="http://schemas.microsoft.com/office/drawing/2014/main" id="{FC69C5D6-EC21-95F9-1084-9BFDE4708C73}"/>
+              </a:ext>
+            </a:extLst>
+          </p:cNvPr>
+          <p:cNvSpPr>
+            <a:spLocks noGrp="1"/>
+          </p:cNvSpPr>
+          <p:nvPr>
+            <p:ph type="title"/>
+          </p:nvPr>
+        </p:nvSpPr>
+        <p:spPr/>
+        <p:txBody>
+          <a:bodyPr>
+            <a:normAutofit/>
+          </a:bodyPr>
+          <a:lstStyle/>
+          <a:p>
+            <a:r>
+              <a:rPr lang="en-US" b="1" cap="all" dirty="0"/>
+              <a:t>RESULTS</a:t>
+            </a:r>
+            <a:br>
+              <a:rPr lang="de-DE" dirty="0"/>
+            </a:br>
+            <a:r>
+              <a:rPr lang="de-DE" sz="3200" dirty="0"/>
               <a:t>Troubleshooting</a:t>
             </a:r>
             <a:endParaRPr lang="de-DE" dirty="0"/>
@@ -3849,11 +4532,150 @@
             <p:ph idx="1"/>
           </p:nvPr>
         </p:nvSpPr>
-        <p:spPr/>
-        <p:txBody>
-          <a:bodyPr/>
-          <a:lstStyle/>
-          <a:p>
+        <p:spPr>
+          <a:xfrm>
+            <a:off x="838200" y="2141537"/>
+            <a:ext cx="10515600" cy="4351338"/>
+          </a:xfrm>
+        </p:spPr>
+        <p:txBody>
+          <a:bodyPr/>
+          <a:lstStyle/>
+          <a:p>
+            <a:r>
+              <a:rPr lang="de-DE" dirty="0"/>
+              <a:t>Hyperparameter (</a:t>
+            </a:r>
+            <a:r>
+              <a:rPr lang="de-DE" dirty="0" err="1"/>
+              <a:t>especially</a:t>
+            </a:r>
+            <a:r>
+              <a:rPr lang="de-DE" dirty="0"/>
+              <a:t> ERP </a:t>
+            </a:r>
+            <a:r>
+              <a:rPr lang="de-DE" dirty="0" err="1"/>
+              <a:t>size</a:t>
+            </a:r>
+            <a:r>
+              <a:rPr lang="de-DE" dirty="0"/>
+              <a:t>)</a:t>
+            </a:r>
+          </a:p>
+          <a:p>
+            <a:endParaRPr lang="de-DE" dirty="0"/>
+          </a:p>
+          <a:p>
+            <a:r>
+              <a:rPr lang="de-DE" dirty="0"/>
+              <a:t>Network Architecture (Pooling </a:t>
+            </a:r>
+            <a:r>
+              <a:rPr lang="de-DE" dirty="0" err="1"/>
+              <a:t>layers</a:t>
+            </a:r>
+            <a:r>
+              <a:rPr lang="de-DE" dirty="0"/>
+              <a:t>)</a:t>
+            </a:r>
+          </a:p>
+          <a:p>
+            <a:endParaRPr lang="de-DE" dirty="0"/>
+          </a:p>
+          <a:p>
+            <a:r>
+              <a:rPr lang="de-DE" dirty="0" err="1"/>
+              <a:t>Datastructure</a:t>
+            </a:r>
+            <a:r>
+              <a:rPr lang="de-DE" dirty="0"/>
+              <a:t> </a:t>
+            </a:r>
+            <a:r>
+              <a:rPr lang="de-DE" dirty="0" err="1"/>
+              <a:t>of</a:t>
+            </a:r>
+            <a:r>
+              <a:rPr lang="de-DE" dirty="0"/>
+              <a:t> </a:t>
+            </a:r>
+            <a:r>
+              <a:rPr lang="de-DE" dirty="0" err="1"/>
+              <a:t>the</a:t>
+            </a:r>
+            <a:r>
+              <a:rPr lang="de-DE" dirty="0"/>
+              <a:t> ERP and </a:t>
+            </a:r>
+            <a:r>
+              <a:rPr lang="de-DE" dirty="0" err="1"/>
+              <a:t>training</a:t>
+            </a:r>
+            <a:r>
+              <a:rPr lang="de-DE" dirty="0"/>
+              <a:t> </a:t>
+            </a:r>
+            <a:r>
+              <a:rPr lang="de-DE" dirty="0" err="1"/>
+              <a:t>data</a:t>
+            </a:r>
+            <a:endParaRPr lang="de-DE" dirty="0"/>
+          </a:p>
+          <a:p>
+            <a:pPr lvl="1"/>
+            <a:r>
+              <a:rPr lang="de-DE" dirty="0" err="1"/>
+              <a:t>Storing</a:t>
+            </a:r>
+            <a:r>
+              <a:rPr lang="de-DE" dirty="0"/>
+              <a:t> </a:t>
+            </a:r>
+            <a:r>
+              <a:rPr lang="de-DE" dirty="0" err="1"/>
+              <a:t>as</a:t>
+            </a:r>
+            <a:r>
+              <a:rPr lang="de-DE" dirty="0"/>
+              <a:t> </a:t>
+            </a:r>
+            <a:r>
+              <a:rPr lang="de-DE" dirty="0" err="1"/>
+              <a:t>numpy</a:t>
+            </a:r>
+            <a:r>
+              <a:rPr lang="de-DE" dirty="0"/>
+              <a:t> </a:t>
+            </a:r>
+            <a:r>
+              <a:rPr lang="de-DE" dirty="0" err="1"/>
+              <a:t>array</a:t>
+            </a:r>
+            <a:r>
+              <a:rPr lang="de-DE" dirty="0"/>
+              <a:t> but </a:t>
+            </a:r>
+            <a:r>
+              <a:rPr lang="de-DE" dirty="0" err="1"/>
+              <a:t>training</a:t>
+            </a:r>
+            <a:r>
+              <a:rPr lang="de-DE" dirty="0"/>
+              <a:t> </a:t>
+            </a:r>
+            <a:r>
+              <a:rPr lang="de-DE" dirty="0" err="1"/>
+              <a:t>as</a:t>
+            </a:r>
+            <a:r>
+              <a:rPr lang="de-DE" dirty="0"/>
+              <a:t> </a:t>
+            </a:r>
+            <a:r>
+              <a:rPr lang="de-DE" dirty="0" err="1"/>
+              <a:t>tf.dataset</a:t>
+            </a:r>
             <a:endParaRPr lang="de-DE" dirty="0"/>
           </a:p>
         </p:txBody>
@@ -3871,7 +4693,7 @@
 </p:sld>
 </file>
 
-<file path=ppt/slides/slide13.xml><?xml version="1.0" encoding="utf-8"?>
+<file path=ppt/slides/slide15.xml><?xml version="1.0" encoding="utf-8"?>
 <p:sld xmlns:a="http://schemas.openxmlformats.org/drawingml/2006/main" xmlns:r="http://schemas.openxmlformats.org/officeDocument/2006/relationships" xmlns:p="http://schemas.openxmlformats.org/presentationml/2006/main">
   <p:cSld>
     <p:spTree>

</xml_diff>